<commit_message>
Correction typo cours 5
</commit_message>
<xml_diff>
--- a/cours/Qualité dev Android - 5 - Acces à internet et coroutines.pptx
+++ b/cours/Qualité dev Android - 5 - Acces à internet et coroutines.pptx
@@ -533,7 +533,7 @@
           <a:p>
             <a:fld id="{22BA6EB6-00D2-9C4B-AC43-F8A484A8D0EA}" type="datetimeFigureOut">
               <a:rPr lang="fr-FR" smtClean="0"/>
-              <a:t>18/12/2023</a:t>
+              <a:t>12/01/2025</a:t>
             </a:fld>
             <a:endParaRPr lang="fr-FR"/>
           </a:p>
@@ -5716,7 +5716,7 @@
           <a:effectLst/>
           <a:extLst>
             <a:ext uri="{91240B29-F687-4f45-9708-019B960494DF}">
-              <a14:hiddenLine xmlns="" xmlns:a14="http://schemas.microsoft.com/office/drawing/2010/main" w="9525">
+              <a14:hiddenLine xmlns:a14="http://schemas.microsoft.com/office/drawing/2010/main" xmlns="" w="9525">
                 <a:solidFill>
                   <a:srgbClr val="000000"/>
                 </a:solidFill>
@@ -5908,7 +5908,7 @@
           <a:p>
             <a:fld id="{2C23D0A1-8F90-5648-B574-1CA494BF5F2B}" type="datetime1">
               <a:rPr lang="fr-FR" smtClean="0"/>
-              <a:t>18/12/2023</a:t>
+              <a:t>12/01/2025</a:t>
             </a:fld>
             <a:endParaRPr lang="fr-FR"/>
           </a:p>
@@ -6229,7 +6229,7 @@
           <a:p>
             <a:fld id="{DD5EE401-40AD-194C-9B19-E665993B2DA4}" type="datetime1">
               <a:rPr lang="fr-FR" smtClean="0"/>
-              <a:t>18/12/2023</a:t>
+              <a:t>12/01/2025</a:t>
             </a:fld>
             <a:endParaRPr lang="fr-FR"/>
           </a:p>
@@ -6720,7 +6720,7 @@
           <a:p>
             <a:fld id="{5E30FAB1-84F2-1947-AEBC-24CCDC230A1A}" type="datetime1">
               <a:rPr lang="fr-FR" smtClean="0"/>
-              <a:t>18/12/2023</a:t>
+              <a:t>12/01/2025</a:t>
             </a:fld>
             <a:endParaRPr lang="fr-FR"/>
           </a:p>
@@ -7092,7 +7092,7 @@
           <a:p>
             <a:fld id="{5440FB5A-E2A8-284E-B6B6-E50320EDC833}" type="datetime1">
               <a:rPr lang="fr-FR" smtClean="0"/>
-              <a:t>18/12/2023</a:t>
+              <a:t>12/01/2025</a:t>
             </a:fld>
             <a:endParaRPr lang="fr-FR"/>
           </a:p>
@@ -7250,7 +7250,7 @@
           <a:ln/>
           <a:extLst>
             <a:ext uri="{91240B29-F687-4f45-9708-019B960494DF}">
-              <a14:hiddenLine xmlns="" xmlns:a14="http://schemas.microsoft.com/office/drawing/2010/main" w="9525">
+              <a14:hiddenLine xmlns:a14="http://schemas.microsoft.com/office/drawing/2010/main" xmlns="" w="9525">
                 <a:solidFill>
                   <a:srgbClr val="000000"/>
                 </a:solidFill>
@@ -7368,7 +7368,7 @@
           <a:p>
             <a:fld id="{DCA352EB-98BE-DC4C-89E1-7C990CCF9030}" type="datetime1">
               <a:rPr lang="fr-FR" smtClean="0"/>
-              <a:t>18/12/2023</a:t>
+              <a:t>12/01/2025</a:t>
             </a:fld>
             <a:endParaRPr lang="fr-FR"/>
           </a:p>
@@ -7528,7 +7528,7 @@
           <a:ln/>
           <a:extLst>
             <a:ext uri="{91240B29-F687-4f45-9708-019B960494DF}">
-              <a14:hiddenLine xmlns="" xmlns:a14="http://schemas.microsoft.com/office/drawing/2010/main" w="9525">
+              <a14:hiddenLine xmlns:a14="http://schemas.microsoft.com/office/drawing/2010/main" xmlns="" w="9525">
                 <a:solidFill>
                   <a:srgbClr val="000000"/>
                 </a:solidFill>
@@ -7656,7 +7656,7 @@
           <a:p>
             <a:fld id="{4162DE05-298B-F248-A469-2F3A18F75589}" type="datetime1">
               <a:rPr lang="fr-FR" smtClean="0"/>
-              <a:t>18/12/2023</a:t>
+              <a:t>12/01/2025</a:t>
             </a:fld>
             <a:endParaRPr lang="fr-FR"/>
           </a:p>
@@ -7814,7 +7814,7 @@
           <a:ln/>
           <a:extLst>
             <a:ext uri="{91240B29-F687-4f45-9708-019B960494DF}">
-              <a14:hiddenLine xmlns="" xmlns:a14="http://schemas.microsoft.com/office/drawing/2010/main" w="9525">
+              <a14:hiddenLine xmlns:a14="http://schemas.microsoft.com/office/drawing/2010/main" xmlns="" w="9525">
                 <a:solidFill>
                   <a:srgbClr val="000000"/>
                 </a:solidFill>
@@ -7942,7 +7942,7 @@
           <a:p>
             <a:fld id="{B7152E00-DF85-DE4A-9C00-34714E5ED729}" type="datetime1">
               <a:rPr lang="fr-FR" smtClean="0"/>
-              <a:t>18/12/2023</a:t>
+              <a:t>12/01/2025</a:t>
             </a:fld>
             <a:endParaRPr lang="fr-FR"/>
           </a:p>
@@ -8288,7 +8288,7 @@
           <a:p>
             <a:fld id="{1FF9B4FD-E02B-9040-A381-072A3C427D15}" type="datetime1">
               <a:rPr lang="fr-FR" smtClean="0"/>
-              <a:t>18/12/2023</a:t>
+              <a:t>12/01/2025</a:t>
             </a:fld>
             <a:endParaRPr lang="fr-FR"/>
           </a:p>
@@ -8446,7 +8446,7 @@
           <a:ln/>
           <a:extLst>
             <a:ext uri="{91240B29-F687-4f45-9708-019B960494DF}">
-              <a14:hiddenLine xmlns="" xmlns:a14="http://schemas.microsoft.com/office/drawing/2010/main" w="9525">
+              <a14:hiddenLine xmlns:a14="http://schemas.microsoft.com/office/drawing/2010/main" xmlns="" w="9525">
                 <a:solidFill>
                   <a:srgbClr val="000000"/>
                 </a:solidFill>
@@ -8630,7 +8630,7 @@
           <a:p>
             <a:fld id="{C09291D6-7844-574C-BA77-41E480603B9B}" type="datetime1">
               <a:rPr lang="fr-FR" smtClean="0"/>
-              <a:t>18/12/2023</a:t>
+              <a:t>12/01/2025</a:t>
             </a:fld>
             <a:endParaRPr lang="fr-FR"/>
           </a:p>
@@ -8788,7 +8788,7 @@
           <a:ln/>
           <a:extLst>
             <a:ext uri="{91240B29-F687-4f45-9708-019B960494DF}">
-              <a14:hiddenLine xmlns="" xmlns:a14="http://schemas.microsoft.com/office/drawing/2010/main" w="9525">
+              <a14:hiddenLine xmlns:a14="http://schemas.microsoft.com/office/drawing/2010/main" xmlns="" w="9525">
                 <a:solidFill>
                   <a:srgbClr val="000000"/>
                 </a:solidFill>
@@ -9110,7 +9110,7 @@
           <a:p>
             <a:fld id="{B8F059AB-F8EA-9145-AE19-717E27B02EC3}" type="datetime1">
               <a:rPr lang="fr-FR" smtClean="0"/>
-              <a:t>18/12/2023</a:t>
+              <a:t>12/01/2025</a:t>
             </a:fld>
             <a:endParaRPr lang="fr-FR"/>
           </a:p>
@@ -9268,7 +9268,7 @@
           <a:ln/>
           <a:extLst>
             <a:ext uri="{91240B29-F687-4f45-9708-019B960494DF}">
-              <a14:hiddenLine xmlns="" xmlns:a14="http://schemas.microsoft.com/office/drawing/2010/main" w="9525">
+              <a14:hiddenLine xmlns:a14="http://schemas.microsoft.com/office/drawing/2010/main" xmlns="" w="9525">
                 <a:solidFill>
                   <a:srgbClr val="000000"/>
                 </a:solidFill>
@@ -9334,7 +9334,7 @@
           <a:p>
             <a:fld id="{28DAA788-9343-1540-AD47-BE2F1FD35827}" type="datetime1">
               <a:rPr lang="fr-FR" smtClean="0"/>
-              <a:t>18/12/2023</a:t>
+              <a:t>12/01/2025</a:t>
             </a:fld>
             <a:endParaRPr lang="fr-FR"/>
           </a:p>
@@ -9432,7 +9432,7 @@
           <a:p>
             <a:fld id="{C79A7E77-705F-1742-88D3-2BF31360C6BB}" type="datetime1">
               <a:rPr lang="fr-FR" smtClean="0"/>
-              <a:t>18/12/2023</a:t>
+              <a:t>12/01/2025</a:t>
             </a:fld>
             <a:endParaRPr lang="fr-FR"/>
           </a:p>
@@ -9703,7 +9703,7 @@
           <a:ln/>
           <a:extLst>
             <a:ext uri="{91240B29-F687-4f45-9708-019B960494DF}">
-              <a14:hiddenLine xmlns="" xmlns:a14="http://schemas.microsoft.com/office/drawing/2010/main" w="9525">
+              <a14:hiddenLine xmlns:a14="http://schemas.microsoft.com/office/drawing/2010/main" xmlns="" w="9525">
                 <a:solidFill>
                   <a:srgbClr val="000000"/>
                 </a:solidFill>
@@ -9902,7 +9902,7 @@
           <a:p>
             <a:fld id="{59A61AF0-A5E3-B742-A040-9540E100F3C1}" type="datetime1">
               <a:rPr lang="fr-FR" smtClean="0"/>
-              <a:t>18/12/2023</a:t>
+              <a:t>12/01/2025</a:t>
             </a:fld>
             <a:endParaRPr lang="fr-FR"/>
           </a:p>
@@ -10218,7 +10218,7 @@
           <a:p>
             <a:fld id="{68C422D3-427B-A240-8849-1BB8DF8E0085}" type="datetime1">
               <a:rPr lang="fr-FR" smtClean="0"/>
-              <a:t>18/12/2023</a:t>
+              <a:t>12/01/2025</a:t>
             </a:fld>
             <a:endParaRPr lang="fr-FR"/>
           </a:p>
@@ -10494,7 +10494,7 @@
           <a:p>
             <a:fld id="{F17E6371-785B-B24A-BE6A-C04BB89D02D5}" type="datetime1">
               <a:rPr lang="fr-FR" smtClean="0"/>
-              <a:t>18/12/2023</a:t>
+              <a:t>12/01/2025</a:t>
             </a:fld>
             <a:endParaRPr lang="fr-FR"/>
           </a:p>
@@ -18204,8 +18204,8 @@
             <a:chExt cx="360" cy="360"/>
           </a:xfrm>
         </p:grpSpPr>
-        <mc:AlternateContent xmlns:mc="http://schemas.openxmlformats.org/markup-compatibility/2006">
-          <mc:Choice xmlns:p14="http://schemas.microsoft.com/office/powerpoint/2010/main" Requires="p14">
+        <mc:AlternateContent xmlns:mc="http://schemas.openxmlformats.org/markup-compatibility/2006" xmlns:p14="http://schemas.microsoft.com/office/powerpoint/2010/main">
+          <mc:Choice Requires="p14">
             <p:contentPart p14:bwMode="auto" r:id="rId5">
               <p14:nvContentPartPr>
                 <p14:cNvPr id="10" name="Encre 9">
@@ -18224,7 +18224,7 @@
               </p14:xfrm>
             </p:contentPart>
           </mc:Choice>
-          <mc:Fallback>
+          <mc:Fallback xmlns="">
             <p:pic>
               <p:nvPicPr>
                 <p:cNvPr id="10" name="Encre 9">
@@ -18255,8 +18255,8 @@
             </p:pic>
           </mc:Fallback>
         </mc:AlternateContent>
-        <mc:AlternateContent xmlns:mc="http://schemas.openxmlformats.org/markup-compatibility/2006">
-          <mc:Choice xmlns:p14="http://schemas.microsoft.com/office/powerpoint/2010/main" Requires="p14">
+        <mc:AlternateContent xmlns:mc="http://schemas.openxmlformats.org/markup-compatibility/2006" xmlns:p14="http://schemas.microsoft.com/office/powerpoint/2010/main">
+          <mc:Choice Requires="p14">
             <p:contentPart p14:bwMode="auto" r:id="rId7">
               <p14:nvContentPartPr>
                 <p14:cNvPr id="11" name="Encre 10">
@@ -18275,7 +18275,7 @@
               </p14:xfrm>
             </p:contentPart>
           </mc:Choice>
-          <mc:Fallback>
+          <mc:Fallback xmlns="">
             <p:pic>
               <p:nvPicPr>
                 <p:cNvPr id="11" name="Encre 10">
@@ -18480,8 +18480,8 @@
           </a:prstGeom>
         </p:spPr>
       </p:pic>
-      <mc:AlternateContent xmlns:mc="http://schemas.openxmlformats.org/markup-compatibility/2006">
-        <mc:Choice xmlns:p14="http://schemas.microsoft.com/office/powerpoint/2010/main" Requires="p14">
+      <mc:AlternateContent xmlns:mc="http://schemas.openxmlformats.org/markup-compatibility/2006" xmlns:p14="http://schemas.microsoft.com/office/powerpoint/2010/main">
+        <mc:Choice Requires="p14">
           <p:contentPart p14:bwMode="auto" r:id="rId5">
             <p14:nvContentPartPr>
               <p14:cNvPr id="10" name="Encre 9">
@@ -18500,7 +18500,7 @@
             </p14:xfrm>
           </p:contentPart>
         </mc:Choice>
-        <mc:Fallback>
+        <mc:Fallback xmlns="">
           <p:pic>
             <p:nvPicPr>
               <p:cNvPr id="10" name="Encre 9">
@@ -18531,8 +18531,8 @@
           </p:pic>
         </mc:Fallback>
       </mc:AlternateContent>
-      <mc:AlternateContent xmlns:mc="http://schemas.openxmlformats.org/markup-compatibility/2006">
-        <mc:Choice xmlns:p14="http://schemas.microsoft.com/office/powerpoint/2010/main" Requires="p14">
+      <mc:AlternateContent xmlns:mc="http://schemas.openxmlformats.org/markup-compatibility/2006" xmlns:p14="http://schemas.microsoft.com/office/powerpoint/2010/main">
+        <mc:Choice Requires="p14">
           <p:contentPart p14:bwMode="auto" r:id="rId7">
             <p14:nvContentPartPr>
               <p14:cNvPr id="13" name="Encre 12">
@@ -18551,7 +18551,7 @@
             </p14:xfrm>
           </p:contentPart>
         </mc:Choice>
-        <mc:Fallback>
+        <mc:Fallback xmlns="">
           <p:pic>
             <p:nvPicPr>
               <p:cNvPr id="13" name="Encre 12">
@@ -18582,8 +18582,8 @@
           </p:pic>
         </mc:Fallback>
       </mc:AlternateContent>
-      <mc:AlternateContent xmlns:mc="http://schemas.openxmlformats.org/markup-compatibility/2006">
-        <mc:Choice xmlns:p14="http://schemas.microsoft.com/office/powerpoint/2010/main" Requires="p14">
+      <mc:AlternateContent xmlns:mc="http://schemas.openxmlformats.org/markup-compatibility/2006" xmlns:p14="http://schemas.microsoft.com/office/powerpoint/2010/main">
+        <mc:Choice Requires="p14">
           <p:contentPart p14:bwMode="auto" r:id="rId9">
             <p14:nvContentPartPr>
               <p14:cNvPr id="15" name="Encre 14">
@@ -18602,7 +18602,7 @@
             </p14:xfrm>
           </p:contentPart>
         </mc:Choice>
-        <mc:Fallback>
+        <mc:Fallback xmlns="">
           <p:pic>
             <p:nvPicPr>
               <p:cNvPr id="15" name="Encre 14">
@@ -18633,8 +18633,8 @@
           </p:pic>
         </mc:Fallback>
       </mc:AlternateContent>
-      <mc:AlternateContent xmlns:mc="http://schemas.openxmlformats.org/markup-compatibility/2006">
-        <mc:Choice xmlns:p14="http://schemas.microsoft.com/office/powerpoint/2010/main" Requires="p14">
+      <mc:AlternateContent xmlns:mc="http://schemas.openxmlformats.org/markup-compatibility/2006" xmlns:p14="http://schemas.microsoft.com/office/powerpoint/2010/main">
+        <mc:Choice Requires="p14">
           <p:contentPart p14:bwMode="auto" r:id="rId11">
             <p14:nvContentPartPr>
               <p14:cNvPr id="16" name="Encre 15">
@@ -18653,7 +18653,7 @@
             </p14:xfrm>
           </p:contentPart>
         </mc:Choice>
-        <mc:Fallback>
+        <mc:Fallback xmlns="">
           <p:pic>
             <p:nvPicPr>
               <p:cNvPr id="16" name="Encre 15">
@@ -18684,8 +18684,8 @@
           </p:pic>
         </mc:Fallback>
       </mc:AlternateContent>
-      <mc:AlternateContent xmlns:mc="http://schemas.openxmlformats.org/markup-compatibility/2006">
-        <mc:Choice xmlns:p14="http://schemas.microsoft.com/office/powerpoint/2010/main" Requires="p14">
+      <mc:AlternateContent xmlns:mc="http://schemas.openxmlformats.org/markup-compatibility/2006" xmlns:p14="http://schemas.microsoft.com/office/powerpoint/2010/main">
+        <mc:Choice Requires="p14">
           <p:contentPart p14:bwMode="auto" r:id="rId13">
             <p14:nvContentPartPr>
               <p14:cNvPr id="17" name="Encre 16">
@@ -18704,7 +18704,7 @@
             </p14:xfrm>
           </p:contentPart>
         </mc:Choice>
-        <mc:Fallback>
+        <mc:Fallback xmlns="">
           <p:pic>
             <p:nvPicPr>
               <p:cNvPr id="17" name="Encre 16">
@@ -19676,7 +19676,7 @@
             <a:pPr lvl="1"/>
             <a:r>
               <a:rPr lang="fr-FR" dirty="0"/>
-              <a:t>Laisser les exceptions remontés au niveau supérieur et les gérer avec block </a:t>
+              <a:t>Laisser les exceptions remontées au niveau supérieur et les gérer avec block </a:t>
             </a:r>
             <a:r>
               <a:rPr lang="fr-FR" b="1" dirty="0" err="1"/>
@@ -20170,15 +20170,7 @@
             </a:r>
             <a:r>
               <a:rPr lang="fr-FR" dirty="0"/>
-              <a:t> Room (base de données) permet de </a:t>
-            </a:r>
-            <a:r>
-              <a:rPr lang="fr-FR" dirty="0" err="1"/>
-              <a:t>stokcer</a:t>
-            </a:r>
-            <a:r>
-              <a:rPr lang="fr-FR" dirty="0"/>
-              <a:t> les données de test dans la mémoire vive</a:t>
+              <a:t> Room (base de données) permet de stocker les données de test dans la mémoire vive</a:t>
             </a:r>
           </a:p>
         </p:txBody>

</xml_diff>